<commit_message>
Updated the slide 1 content
</commit_message>
<xml_diff>
--- a/vulnerability_summary_with_table.pptx
+++ b/vulnerability_summary_with_table.pptx
@@ -5,10 +5,10 @@
     <p:sldMasterId id="2147483648" r:id="rId1"/>
   </p:sldMasterIdLst>
   <p:sldIdLst>
-    <p:sldId id="256" r:id="rId2"/>
-    <p:sldId id="257" r:id="rId3"/>
+    <p:sldId id="256" r:id="rId7"/>
+    <p:sldId id="257" r:id="rId8"/>
   </p:sldIdLst>
-  <p:sldSz cx="7559675" cy="10080625"/>
+  <p:sldSz cx="7560000" cy="10080000" type="screen4x3"/>
   <p:notesSz cx="6858000" cy="9144000"/>
   <p:defaultTextStyle>
     <a:defPPr>
@@ -105,31 +105,12 @@
       </a:defRPr>
     </a:lvl9pPr>
   </p:defaultTextStyle>
-  <p:extLst>
-    <p:ext uri="{EFAFB233-063F-42B5-8137-9DF3F51BA10A}">
-      <p15:sldGuideLst xmlns:p15="http://schemas.microsoft.com/office/powerpoint/2012/main">
-        <p15:guide id="1" orient="horz" pos="2160">
-          <p15:clr>
-            <a:srgbClr val="A4A3A4"/>
-          </p15:clr>
-        </p15:guide>
-        <p15:guide id="2" pos="2880">
-          <p15:clr>
-            <a:srgbClr val="A4A3A4"/>
-          </p15:clr>
-        </p15:guide>
-      </p15:sldGuideLst>
-    </p:ext>
-  </p:extLst>
 </p:presentation>
 </file>
 
 <file path=ppt/charts/chart1.xml><?xml version="1.0" encoding="utf-8"?>
-<c:chartSpace xmlns:c="http://schemas.openxmlformats.org/drawingml/2006/chart" xmlns:a="http://schemas.openxmlformats.org/drawingml/2006/main" xmlns:r="http://schemas.openxmlformats.org/officeDocument/2006/relationships" xmlns:c16r2="http://schemas.microsoft.com/office/drawing/2015/06/chart">
+<c:chartSpace xmlns:c="http://schemas.openxmlformats.org/drawingml/2006/chart" xmlns:a="http://schemas.openxmlformats.org/drawingml/2006/main" xmlns:r="http://schemas.openxmlformats.org/officeDocument/2006/relationships">
   <c:date1904 val="0"/>
-  <c:lang val="en-US"/>
-  <c:roundedCorners val="1"/>
-  <c:style val="2"/>
   <c:chart>
     <c:title>
       <c:tx>
@@ -145,21 +126,19 @@
               </a:defRPr>
             </a:pPr>
             <a:r>
-              <a:rPr lang="en-IN"/>
               <a:t>Vulnerability Count</a:t>
             </a:r>
           </a:p>
         </c:rich>
       </c:tx>
+      <c:layout/>
       <c:overlay val="0"/>
     </c:title>
     <c:autoTitleDeleted val="0"/>
     <c:plotArea>
-      <c:layout/>
       <c:barChart>
         <c:barDir val="col"/>
         <c:grouping val="clustered"/>
-        <c:varyColors val="1"/>
         <c:ser>
           <c:idx val="0"/>
           <c:order val="0"/>
@@ -174,75 +153,39 @@
               </c:strCache>
             </c:strRef>
           </c:tx>
-          <c:invertIfNegative val="1"/>
           <c:dPt>
             <c:idx val="0"/>
-            <c:invertIfNegative val="1"/>
-            <c:bubble3D val="0"/>
             <c:spPr>
               <a:solidFill>
                 <a:srgbClr val="B40000"/>
               </a:solidFill>
             </c:spPr>
-            <c:extLst>
-              <c:ext xmlns:c16="http://schemas.microsoft.com/office/drawing/2014/chart" uri="{C3380CC4-5D6E-409C-BE32-E72D297353CC}">
-                <c16:uniqueId val="{00000001-A836-44E7-8AD0-A3566AA2D187}"/>
-              </c:ext>
-            </c:extLst>
           </c:dPt>
           <c:dPt>
             <c:idx val="1"/>
-            <c:invertIfNegative val="1"/>
-            <c:bubble3D val="0"/>
             <c:spPr>
               <a:solidFill>
                 <a:srgbClr val="DC0000"/>
               </a:solidFill>
             </c:spPr>
-            <c:extLst>
-              <c:ext xmlns:c16="http://schemas.microsoft.com/office/drawing/2014/chart" uri="{C3380CC4-5D6E-409C-BE32-E72D297353CC}">
-                <c16:uniqueId val="{00000003-A836-44E7-8AD0-A3566AA2D187}"/>
-              </c:ext>
-            </c:extLst>
           </c:dPt>
           <c:dPt>
             <c:idx val="2"/>
-            <c:invertIfNegative val="1"/>
-            <c:bubble3D val="0"/>
             <c:spPr>
               <a:solidFill>
                 <a:srgbClr val="FFA500"/>
               </a:solidFill>
             </c:spPr>
-            <c:extLst>
-              <c:ext xmlns:c16="http://schemas.microsoft.com/office/drawing/2014/chart" uri="{C3380CC4-5D6E-409C-BE32-E72D297353CC}">
-                <c16:uniqueId val="{00000005-A836-44E7-8AD0-A3566AA2D187}"/>
-              </c:ext>
-            </c:extLst>
           </c:dPt>
           <c:dPt>
             <c:idx val="3"/>
-            <c:invertIfNegative val="1"/>
-            <c:bubble3D val="0"/>
             <c:spPr>
               <a:solidFill>
                 <a:srgbClr val="FFDC00"/>
               </a:solidFill>
             </c:spPr>
-            <c:extLst>
-              <c:ext xmlns:c16="http://schemas.microsoft.com/office/drawing/2014/chart" uri="{C3380CC4-5D6E-409C-BE32-E72D297353CC}">
-                <c16:uniqueId val="{00000007-A836-44E7-8AD0-A3566AA2D187}"/>
-              </c:ext>
-            </c:extLst>
           </c:dPt>
           <c:dLbls>
-            <c:spPr>
-              <a:noFill/>
-              <a:ln>
-                <a:noFill/>
-              </a:ln>
-              <a:effectLst/>
-            </c:spPr>
             <c:txPr>
               <a:bodyPr/>
               <a:lstStyle/>
@@ -254,7 +197,6 @@
                     </a:solidFill>
                   </a:defRPr>
                 </a:pPr>
-                <a:endParaRPr lang="en-US"/>
               </a:p>
             </c:txPr>
             <c:showLegendKey val="0"/>
@@ -263,12 +205,7 @@
             <c:showSerName val="0"/>
             <c:showPercent val="0"/>
             <c:showBubbleSize val="0"/>
-            <c:showLeaderLines val="0"/>
-            <c:extLst>
-              <c:ext xmlns:c15="http://schemas.microsoft.com/office/drawing/2012/chart" uri="{CE6537A1-D6FC-4f65-9D91-7224C49458BB}">
-                <c15:showLeaderLines val="0"/>
-              </c:ext>
-            </c:extLst>
+            <c:showLeaderLines val="1"/>
           </c:dLbls>
           <c:cat>
             <c:strRef>
@@ -311,21 +248,7 @@
               </c:numCache>
             </c:numRef>
           </c:val>
-          <c:extLst>
-            <c:ext xmlns:c16="http://schemas.microsoft.com/office/drawing/2014/chart" uri="{C3380CC4-5D6E-409C-BE32-E72D297353CC}">
-              <c16:uniqueId val="{00000008-A836-44E7-8AD0-A3566AA2D187}"/>
-            </c:ext>
-          </c:extLst>
         </c:ser>
-        <c:dLbls>
-          <c:showLegendKey val="0"/>
-          <c:showVal val="0"/>
-          <c:showCatName val="0"/>
-          <c:showSerName val="0"/>
-          <c:showPercent val="0"/>
-          <c:showBubbleSize val="0"/>
-        </c:dLbls>
-        <c:gapWidth val="150"/>
         <c:axId val="-2068027336"/>
         <c:axId val="-2113994440"/>
       </c:barChart>
@@ -336,7 +259,6 @@
         </c:scaling>
         <c:delete val="0"/>
         <c:axPos val="b"/>
-        <c:numFmt formatCode="General" sourceLinked="0"/>
         <c:majorTickMark val="out"/>
         <c:minorTickMark val="none"/>
         <c:tickLblPos val="nextTo"/>
@@ -347,7 +269,6 @@
             <a:pPr>
               <a:defRPr sz="850"/>
             </a:pPr>
-            <a:endParaRPr lang="en-US"/>
           </a:p>
         </c:txPr>
         <c:crossAx val="-2113994440"/>
@@ -360,9 +281,8 @@
       <c:valAx>
         <c:axId val="-2113994440"/>
         <c:scaling>
-          <c:orientation val="minMax"/>
           <c:max val="5.5"/>
-          <c:min val="0"/>
+          <c:min val="0.0"/>
         </c:scaling>
         <c:delete val="0"/>
         <c:axPos val="l"/>
@@ -375,7 +295,6 @@
             </a:ln>
           </c:spPr>
         </c:majorGridlines>
-        <c:numFmt formatCode="General" sourceLinked="1"/>
         <c:majorTickMark val="out"/>
         <c:minorTickMark val="none"/>
         <c:tickLblPos val="nextTo"/>
@@ -386,18 +305,14 @@
             <a:pPr>
               <a:defRPr sz="850"/>
             </a:pPr>
-            <a:endParaRPr lang="en-US"/>
           </a:p>
         </c:txPr>
         <c:crossAx val="-2068027336"/>
         <c:crosses val="autoZero"/>
-        <c:crossBetween val="between"/>
-        <c:majorUnit val="1"/>
+        <c:majorUnit val="1.0"/>
       </c:valAx>
     </c:plotArea>
-    <c:plotVisOnly val="1"/>
     <c:dispBlanksAs val="gap"/>
-    <c:showDLblsOverMax val="1"/>
   </c:chart>
   <c:txPr>
     <a:bodyPr/>
@@ -453,9 +368,10 @@
           <a:lstStyle/>
           <a:p>
             <a:r>
-              <a:rPr lang="en-US"/>
+              <a:rPr lang="en-US" smtClean="0"/>
               <a:t>Click to edit Master title style</a:t>
             </a:r>
+            <a:endParaRPr lang="en-US"/>
           </a:p>
         </p:txBody>
       </p:sp>
@@ -571,9 +487,10 @@
           </a:lstStyle>
           <a:p>
             <a:r>
-              <a:rPr lang="en-US"/>
+              <a:rPr lang="en-US" smtClean="0"/>
               <a:t>Click to edit Master subtitle style</a:t>
             </a:r>
+            <a:endParaRPr lang="en-US"/>
           </a:p>
         </p:txBody>
       </p:sp>
@@ -594,7 +511,7 @@
           <a:p>
             <a:fld id="{5BCAD085-E8A6-8845-BD4E-CB4CCA059FC4}" type="datetimeFigureOut">
               <a:rPr lang="en-US" smtClean="0"/>
-              <a:t>8/26/2025</a:t>
+              <a:t>1/27/13</a:t>
             </a:fld>
             <a:endParaRPr lang="en-US"/>
           </a:p>
@@ -688,9 +605,10 @@
           <a:lstStyle/>
           <a:p>
             <a:r>
-              <a:rPr lang="en-US"/>
+              <a:rPr lang="en-US" smtClean="0"/>
               <a:t>Click to edit Master title style</a:t>
             </a:r>
+            <a:endParaRPr lang="en-US"/>
           </a:p>
         </p:txBody>
       </p:sp>
@@ -711,37 +629,38 @@
           <a:p>
             <a:pPr lvl="0"/>
             <a:r>
-              <a:rPr lang="en-US"/>
+              <a:rPr lang="en-US" smtClean="0"/>
               <a:t>Click to edit Master text styles</a:t>
             </a:r>
           </a:p>
           <a:p>
             <a:pPr lvl="1"/>
             <a:r>
-              <a:rPr lang="en-US"/>
+              <a:rPr lang="en-US" smtClean="0"/>
               <a:t>Second level</a:t>
             </a:r>
           </a:p>
           <a:p>
             <a:pPr lvl="2"/>
             <a:r>
-              <a:rPr lang="en-US"/>
+              <a:rPr lang="en-US" smtClean="0"/>
               <a:t>Third level</a:t>
             </a:r>
           </a:p>
           <a:p>
             <a:pPr lvl="3"/>
             <a:r>
-              <a:rPr lang="en-US"/>
+              <a:rPr lang="en-US" smtClean="0"/>
               <a:t>Fourth level</a:t>
             </a:r>
           </a:p>
           <a:p>
             <a:pPr lvl="4"/>
             <a:r>
-              <a:rPr lang="en-US"/>
+              <a:rPr lang="en-US" smtClean="0"/>
               <a:t>Fifth level</a:t>
             </a:r>
+            <a:endParaRPr lang="en-US"/>
           </a:p>
         </p:txBody>
       </p:sp>
@@ -762,7 +681,7 @@
           <a:p>
             <a:fld id="{5BCAD085-E8A6-8845-BD4E-CB4CCA059FC4}" type="datetimeFigureOut">
               <a:rPr lang="en-US" smtClean="0"/>
-              <a:t>8/26/2025</a:t>
+              <a:t>1/27/13</a:t>
             </a:fld>
             <a:endParaRPr lang="en-US"/>
           </a:p>
@@ -861,9 +780,10 @@
           <a:lstStyle/>
           <a:p>
             <a:r>
-              <a:rPr lang="en-US"/>
+              <a:rPr lang="en-US" smtClean="0"/>
               <a:t>Click to edit Master title style</a:t>
             </a:r>
+            <a:endParaRPr lang="en-US"/>
           </a:p>
         </p:txBody>
       </p:sp>
@@ -889,37 +809,38 @@
           <a:p>
             <a:pPr lvl="0"/>
             <a:r>
-              <a:rPr lang="en-US"/>
+              <a:rPr lang="en-US" smtClean="0"/>
               <a:t>Click to edit Master text styles</a:t>
             </a:r>
           </a:p>
           <a:p>
             <a:pPr lvl="1"/>
             <a:r>
-              <a:rPr lang="en-US"/>
+              <a:rPr lang="en-US" smtClean="0"/>
               <a:t>Second level</a:t>
             </a:r>
           </a:p>
           <a:p>
             <a:pPr lvl="2"/>
             <a:r>
-              <a:rPr lang="en-US"/>
+              <a:rPr lang="en-US" smtClean="0"/>
               <a:t>Third level</a:t>
             </a:r>
           </a:p>
           <a:p>
             <a:pPr lvl="3"/>
             <a:r>
-              <a:rPr lang="en-US"/>
+              <a:rPr lang="en-US" smtClean="0"/>
               <a:t>Fourth level</a:t>
             </a:r>
           </a:p>
           <a:p>
             <a:pPr lvl="4"/>
             <a:r>
-              <a:rPr lang="en-US"/>
+              <a:rPr lang="en-US" smtClean="0"/>
               <a:t>Fifth level</a:t>
             </a:r>
+            <a:endParaRPr lang="en-US"/>
           </a:p>
         </p:txBody>
       </p:sp>
@@ -940,7 +861,7 @@
           <a:p>
             <a:fld id="{5BCAD085-E8A6-8845-BD4E-CB4CCA059FC4}" type="datetimeFigureOut">
               <a:rPr lang="en-US" smtClean="0"/>
-              <a:t>8/26/2025</a:t>
+              <a:t>1/27/13</a:t>
             </a:fld>
             <a:endParaRPr lang="en-US"/>
           </a:p>
@@ -1034,9 +955,10 @@
           <a:lstStyle/>
           <a:p>
             <a:r>
-              <a:rPr lang="en-US"/>
+              <a:rPr lang="en-US" smtClean="0"/>
               <a:t>Click to edit Master title style</a:t>
             </a:r>
+            <a:endParaRPr lang="en-US"/>
           </a:p>
         </p:txBody>
       </p:sp>
@@ -1057,37 +979,38 @@
           <a:p>
             <a:pPr lvl="0"/>
             <a:r>
-              <a:rPr lang="en-US"/>
+              <a:rPr lang="en-US" smtClean="0"/>
               <a:t>Click to edit Master text styles</a:t>
             </a:r>
           </a:p>
           <a:p>
             <a:pPr lvl="1"/>
             <a:r>
-              <a:rPr lang="en-US"/>
+              <a:rPr lang="en-US" smtClean="0"/>
               <a:t>Second level</a:t>
             </a:r>
           </a:p>
           <a:p>
             <a:pPr lvl="2"/>
             <a:r>
-              <a:rPr lang="en-US"/>
+              <a:rPr lang="en-US" smtClean="0"/>
               <a:t>Third level</a:t>
             </a:r>
           </a:p>
           <a:p>
             <a:pPr lvl="3"/>
             <a:r>
-              <a:rPr lang="en-US"/>
+              <a:rPr lang="en-US" smtClean="0"/>
               <a:t>Fourth level</a:t>
             </a:r>
           </a:p>
           <a:p>
             <a:pPr lvl="4"/>
             <a:r>
-              <a:rPr lang="en-US"/>
+              <a:rPr lang="en-US" smtClean="0"/>
               <a:t>Fifth level</a:t>
             </a:r>
+            <a:endParaRPr lang="en-US"/>
           </a:p>
         </p:txBody>
       </p:sp>
@@ -1108,7 +1031,7 @@
           <a:p>
             <a:fld id="{5BCAD085-E8A6-8845-BD4E-CB4CCA059FC4}" type="datetimeFigureOut">
               <a:rPr lang="en-US" smtClean="0"/>
-              <a:t>8/26/2025</a:t>
+              <a:t>1/27/13</a:t>
             </a:fld>
             <a:endParaRPr lang="en-US"/>
           </a:p>
@@ -1211,9 +1134,10 @@
           </a:lstStyle>
           <a:p>
             <a:r>
-              <a:rPr lang="en-US"/>
+              <a:rPr lang="en-US" smtClean="0"/>
               <a:t>Click to edit Master title style</a:t>
             </a:r>
+            <a:endParaRPr lang="en-US"/>
           </a:p>
         </p:txBody>
       </p:sp>
@@ -1330,7 +1254,7 @@
           <a:p>
             <a:pPr lvl="0"/>
             <a:r>
-              <a:rPr lang="en-US"/>
+              <a:rPr lang="en-US" smtClean="0"/>
               <a:t>Click to edit Master text styles</a:t>
             </a:r>
           </a:p>
@@ -1353,7 +1277,7 @@
           <a:p>
             <a:fld id="{5BCAD085-E8A6-8845-BD4E-CB4CCA059FC4}" type="datetimeFigureOut">
               <a:rPr lang="en-US" smtClean="0"/>
-              <a:t>8/26/2025</a:t>
+              <a:t>1/27/13</a:t>
             </a:fld>
             <a:endParaRPr lang="en-US"/>
           </a:p>
@@ -1447,9 +1371,10 @@
           <a:lstStyle/>
           <a:p>
             <a:r>
-              <a:rPr lang="en-US"/>
+              <a:rPr lang="en-US" smtClean="0"/>
               <a:t>Click to edit Master title style</a:t>
             </a:r>
+            <a:endParaRPr lang="en-US"/>
           </a:p>
         </p:txBody>
       </p:sp>
@@ -1503,37 +1428,38 @@
           <a:p>
             <a:pPr lvl="0"/>
             <a:r>
-              <a:rPr lang="en-US"/>
+              <a:rPr lang="en-US" smtClean="0"/>
               <a:t>Click to edit Master text styles</a:t>
             </a:r>
           </a:p>
           <a:p>
             <a:pPr lvl="1"/>
             <a:r>
-              <a:rPr lang="en-US"/>
+              <a:rPr lang="en-US" smtClean="0"/>
               <a:t>Second level</a:t>
             </a:r>
           </a:p>
           <a:p>
             <a:pPr lvl="2"/>
             <a:r>
-              <a:rPr lang="en-US"/>
+              <a:rPr lang="en-US" smtClean="0"/>
               <a:t>Third level</a:t>
             </a:r>
           </a:p>
           <a:p>
             <a:pPr lvl="3"/>
             <a:r>
-              <a:rPr lang="en-US"/>
+              <a:rPr lang="en-US" smtClean="0"/>
               <a:t>Fourth level</a:t>
             </a:r>
           </a:p>
           <a:p>
             <a:pPr lvl="4"/>
             <a:r>
-              <a:rPr lang="en-US"/>
+              <a:rPr lang="en-US" smtClean="0"/>
               <a:t>Fifth level</a:t>
             </a:r>
+            <a:endParaRPr lang="en-US"/>
           </a:p>
         </p:txBody>
       </p:sp>
@@ -1587,37 +1513,38 @@
           <a:p>
             <a:pPr lvl="0"/>
             <a:r>
-              <a:rPr lang="en-US"/>
+              <a:rPr lang="en-US" smtClean="0"/>
               <a:t>Click to edit Master text styles</a:t>
             </a:r>
           </a:p>
           <a:p>
             <a:pPr lvl="1"/>
             <a:r>
-              <a:rPr lang="en-US"/>
+              <a:rPr lang="en-US" smtClean="0"/>
               <a:t>Second level</a:t>
             </a:r>
           </a:p>
           <a:p>
             <a:pPr lvl="2"/>
             <a:r>
-              <a:rPr lang="en-US"/>
+              <a:rPr lang="en-US" smtClean="0"/>
               <a:t>Third level</a:t>
             </a:r>
           </a:p>
           <a:p>
             <a:pPr lvl="3"/>
             <a:r>
-              <a:rPr lang="en-US"/>
+              <a:rPr lang="en-US" smtClean="0"/>
               <a:t>Fourth level</a:t>
             </a:r>
           </a:p>
           <a:p>
             <a:pPr lvl="4"/>
             <a:r>
-              <a:rPr lang="en-US"/>
+              <a:rPr lang="en-US" smtClean="0"/>
               <a:t>Fifth level</a:t>
             </a:r>
+            <a:endParaRPr lang="en-US"/>
           </a:p>
         </p:txBody>
       </p:sp>
@@ -1638,7 +1565,7 @@
           <a:p>
             <a:fld id="{5BCAD085-E8A6-8845-BD4E-CB4CCA059FC4}" type="datetimeFigureOut">
               <a:rPr lang="en-US" smtClean="0"/>
-              <a:t>8/26/2025</a:t>
+              <a:t>1/27/13</a:t>
             </a:fld>
             <a:endParaRPr lang="en-US"/>
           </a:p>
@@ -1736,9 +1663,10 @@
           </a:lstStyle>
           <a:p>
             <a:r>
-              <a:rPr lang="en-US"/>
+              <a:rPr lang="en-US" smtClean="0"/>
               <a:t>Click to edit Master title style</a:t>
             </a:r>
+            <a:endParaRPr lang="en-US"/>
           </a:p>
         </p:txBody>
       </p:sp>
@@ -1801,7 +1729,7 @@
           <a:p>
             <a:pPr lvl="0"/>
             <a:r>
-              <a:rPr lang="en-US"/>
+              <a:rPr lang="en-US" smtClean="0"/>
               <a:t>Click to edit Master text styles</a:t>
             </a:r>
           </a:p>
@@ -1857,37 +1785,38 @@
           <a:p>
             <a:pPr lvl="0"/>
             <a:r>
-              <a:rPr lang="en-US"/>
+              <a:rPr lang="en-US" smtClean="0"/>
               <a:t>Click to edit Master text styles</a:t>
             </a:r>
           </a:p>
           <a:p>
             <a:pPr lvl="1"/>
             <a:r>
-              <a:rPr lang="en-US"/>
+              <a:rPr lang="en-US" smtClean="0"/>
               <a:t>Second level</a:t>
             </a:r>
           </a:p>
           <a:p>
             <a:pPr lvl="2"/>
             <a:r>
-              <a:rPr lang="en-US"/>
+              <a:rPr lang="en-US" smtClean="0"/>
               <a:t>Third level</a:t>
             </a:r>
           </a:p>
           <a:p>
             <a:pPr lvl="3"/>
             <a:r>
-              <a:rPr lang="en-US"/>
+              <a:rPr lang="en-US" smtClean="0"/>
               <a:t>Fourth level</a:t>
             </a:r>
           </a:p>
           <a:p>
             <a:pPr lvl="4"/>
             <a:r>
-              <a:rPr lang="en-US"/>
+              <a:rPr lang="en-US" smtClean="0"/>
               <a:t>Fifth level</a:t>
             </a:r>
+            <a:endParaRPr lang="en-US"/>
           </a:p>
         </p:txBody>
       </p:sp>
@@ -1950,7 +1879,7 @@
           <a:p>
             <a:pPr lvl="0"/>
             <a:r>
-              <a:rPr lang="en-US"/>
+              <a:rPr lang="en-US" smtClean="0"/>
               <a:t>Click to edit Master text styles</a:t>
             </a:r>
           </a:p>
@@ -2006,37 +1935,38 @@
           <a:p>
             <a:pPr lvl="0"/>
             <a:r>
-              <a:rPr lang="en-US"/>
+              <a:rPr lang="en-US" smtClean="0"/>
               <a:t>Click to edit Master text styles</a:t>
             </a:r>
           </a:p>
           <a:p>
             <a:pPr lvl="1"/>
             <a:r>
-              <a:rPr lang="en-US"/>
+              <a:rPr lang="en-US" smtClean="0"/>
               <a:t>Second level</a:t>
             </a:r>
           </a:p>
           <a:p>
             <a:pPr lvl="2"/>
             <a:r>
-              <a:rPr lang="en-US"/>
+              <a:rPr lang="en-US" smtClean="0"/>
               <a:t>Third level</a:t>
             </a:r>
           </a:p>
           <a:p>
             <a:pPr lvl="3"/>
             <a:r>
-              <a:rPr lang="en-US"/>
+              <a:rPr lang="en-US" smtClean="0"/>
               <a:t>Fourth level</a:t>
             </a:r>
           </a:p>
           <a:p>
             <a:pPr lvl="4"/>
             <a:r>
-              <a:rPr lang="en-US"/>
+              <a:rPr lang="en-US" smtClean="0"/>
               <a:t>Fifth level</a:t>
             </a:r>
+            <a:endParaRPr lang="en-US"/>
           </a:p>
         </p:txBody>
       </p:sp>
@@ -2057,7 +1987,7 @@
           <a:p>
             <a:fld id="{5BCAD085-E8A6-8845-BD4E-CB4CCA059FC4}" type="datetimeFigureOut">
               <a:rPr lang="en-US" smtClean="0"/>
-              <a:t>8/26/2025</a:t>
+              <a:t>1/27/13</a:t>
             </a:fld>
             <a:endParaRPr lang="en-US"/>
           </a:p>
@@ -2151,9 +2081,10 @@
           <a:lstStyle/>
           <a:p>
             <a:r>
-              <a:rPr lang="en-US"/>
+              <a:rPr lang="en-US" smtClean="0"/>
               <a:t>Click to edit Master title style</a:t>
             </a:r>
+            <a:endParaRPr lang="en-US"/>
           </a:p>
         </p:txBody>
       </p:sp>
@@ -2174,7 +2105,7 @@
           <a:p>
             <a:fld id="{5BCAD085-E8A6-8845-BD4E-CB4CCA059FC4}" type="datetimeFigureOut">
               <a:rPr lang="en-US" smtClean="0"/>
-              <a:t>8/26/2025</a:t>
+              <a:t>1/27/13</a:t>
             </a:fld>
             <a:endParaRPr lang="en-US"/>
           </a:p>
@@ -2269,7 +2200,7 @@
           <a:p>
             <a:fld id="{5BCAD085-E8A6-8845-BD4E-CB4CCA059FC4}" type="datetimeFigureOut">
               <a:rPr lang="en-US" smtClean="0"/>
-              <a:t>8/26/2025</a:t>
+              <a:t>1/27/13</a:t>
             </a:fld>
             <a:endParaRPr lang="en-US"/>
           </a:p>
@@ -2372,9 +2303,10 @@
           </a:lstStyle>
           <a:p>
             <a:r>
-              <a:rPr lang="en-US"/>
+              <a:rPr lang="en-US" smtClean="0"/>
               <a:t>Click to edit Master title style</a:t>
             </a:r>
+            <a:endParaRPr lang="en-US"/>
           </a:p>
         </p:txBody>
       </p:sp>
@@ -2428,37 +2360,38 @@
           <a:p>
             <a:pPr lvl="0"/>
             <a:r>
-              <a:rPr lang="en-US"/>
+              <a:rPr lang="en-US" smtClean="0"/>
               <a:t>Click to edit Master text styles</a:t>
             </a:r>
           </a:p>
           <a:p>
             <a:pPr lvl="1"/>
             <a:r>
-              <a:rPr lang="en-US"/>
+              <a:rPr lang="en-US" smtClean="0"/>
               <a:t>Second level</a:t>
             </a:r>
           </a:p>
           <a:p>
             <a:pPr lvl="2"/>
             <a:r>
-              <a:rPr lang="en-US"/>
+              <a:rPr lang="en-US" smtClean="0"/>
               <a:t>Third level</a:t>
             </a:r>
           </a:p>
           <a:p>
             <a:pPr lvl="3"/>
             <a:r>
-              <a:rPr lang="en-US"/>
+              <a:rPr lang="en-US" smtClean="0"/>
               <a:t>Fourth level</a:t>
             </a:r>
           </a:p>
           <a:p>
             <a:pPr lvl="4"/>
             <a:r>
-              <a:rPr lang="en-US"/>
+              <a:rPr lang="en-US" smtClean="0"/>
               <a:t>Fifth level</a:t>
             </a:r>
+            <a:endParaRPr lang="en-US"/>
           </a:p>
         </p:txBody>
       </p:sp>
@@ -2521,7 +2454,7 @@
           <a:p>
             <a:pPr lvl="0"/>
             <a:r>
-              <a:rPr lang="en-US"/>
+              <a:rPr lang="en-US" smtClean="0"/>
               <a:t>Click to edit Master text styles</a:t>
             </a:r>
           </a:p>
@@ -2544,7 +2477,7 @@
           <a:p>
             <a:fld id="{5BCAD085-E8A6-8845-BD4E-CB4CCA059FC4}" type="datetimeFigureOut">
               <a:rPr lang="en-US" smtClean="0"/>
-              <a:t>8/26/2025</a:t>
+              <a:t>1/27/13</a:t>
             </a:fld>
             <a:endParaRPr lang="en-US"/>
           </a:p>
@@ -2647,9 +2580,10 @@
           </a:lstStyle>
           <a:p>
             <a:r>
-              <a:rPr lang="en-US"/>
+              <a:rPr lang="en-US" smtClean="0"/>
               <a:t>Click to edit Master title style</a:t>
             </a:r>
+            <a:endParaRPr lang="en-US"/>
           </a:p>
         </p:txBody>
       </p:sp>
@@ -2773,7 +2707,7 @@
           <a:p>
             <a:pPr lvl="0"/>
             <a:r>
-              <a:rPr lang="en-US"/>
+              <a:rPr lang="en-US" smtClean="0"/>
               <a:t>Click to edit Master text styles</a:t>
             </a:r>
           </a:p>
@@ -2796,7 +2730,7 @@
           <a:p>
             <a:fld id="{5BCAD085-E8A6-8845-BD4E-CB4CCA059FC4}" type="datetimeFigureOut">
               <a:rPr lang="en-US" smtClean="0"/>
-              <a:t>8/26/2025</a:t>
+              <a:t>1/27/13</a:t>
             </a:fld>
             <a:endParaRPr lang="en-US"/>
           </a:p>
@@ -2905,9 +2839,10 @@
           <a:lstStyle/>
           <a:p>
             <a:r>
-              <a:rPr lang="en-US"/>
+              <a:rPr lang="en-US" smtClean="0"/>
               <a:t>Click to edit Master title style</a:t>
             </a:r>
+            <a:endParaRPr lang="en-US"/>
           </a:p>
         </p:txBody>
       </p:sp>
@@ -2938,37 +2873,38 @@
           <a:p>
             <a:pPr lvl="0"/>
             <a:r>
-              <a:rPr lang="en-US"/>
+              <a:rPr lang="en-US" smtClean="0"/>
               <a:t>Click to edit Master text styles</a:t>
             </a:r>
           </a:p>
           <a:p>
             <a:pPr lvl="1"/>
             <a:r>
-              <a:rPr lang="en-US"/>
+              <a:rPr lang="en-US" smtClean="0"/>
               <a:t>Second level</a:t>
             </a:r>
           </a:p>
           <a:p>
             <a:pPr lvl="2"/>
             <a:r>
-              <a:rPr lang="en-US"/>
+              <a:rPr lang="en-US" smtClean="0"/>
               <a:t>Third level</a:t>
             </a:r>
           </a:p>
           <a:p>
             <a:pPr lvl="3"/>
             <a:r>
-              <a:rPr lang="en-US"/>
+              <a:rPr lang="en-US" smtClean="0"/>
               <a:t>Fourth level</a:t>
             </a:r>
           </a:p>
           <a:p>
             <a:pPr lvl="4"/>
             <a:r>
-              <a:rPr lang="en-US"/>
+              <a:rPr lang="en-US" smtClean="0"/>
               <a:t>Fifth level</a:t>
             </a:r>
+            <a:endParaRPr lang="en-US"/>
           </a:p>
         </p:txBody>
       </p:sp>
@@ -3007,7 +2943,7 @@
           <a:p>
             <a:fld id="{5BCAD085-E8A6-8845-BD4E-CB4CCA059FC4}" type="datetimeFigureOut">
               <a:rPr lang="en-US" smtClean="0"/>
-              <a:t>8/26/2025</a:t>
+              <a:t>1/27/13</a:t>
             </a:fld>
             <a:endParaRPr lang="en-US"/>
           </a:p>
@@ -3366,7 +3302,7 @@
 </file>
 
 <file path=ppt/slides/slide1.xml><?xml version="1.0" encoding="utf-8"?>
-<p:sld xmlns:a="http://schemas.openxmlformats.org/drawingml/2006/main" xmlns:r="http://schemas.openxmlformats.org/officeDocument/2006/relationships" xmlns:p="http://schemas.openxmlformats.org/presentationml/2006/main">
+<p:sld xmlns:a="http://schemas.openxmlformats.org/drawingml/2006/main" xmlns:p="http://schemas.openxmlformats.org/presentationml/2006/main" xmlns:r="http://schemas.openxmlformats.org/officeDocument/2006/relationships">
   <p:cSld>
     <p:spTree>
       <p:nvGrpSpPr>
@@ -3374,14 +3310,7 @@
         <p:cNvGrpSpPr/>
         <p:nvPr/>
       </p:nvGrpSpPr>
-      <p:grpSpPr>
-        <a:xfrm>
-          <a:off x="0" y="0"/>
-          <a:ext cx="0" cy="0"/>
-          <a:chOff x="0" y="0"/>
-          <a:chExt cx="0" cy="0"/>
-        </a:xfrm>
-      </p:grpSpPr>
+      <p:grpSpPr/>
       <p:pic>
         <p:nvPicPr>
           <p:cNvPr id="2" name="Picture 1" descr="1.jpg"/>
@@ -3446,7 +3375,6 @@
           <a:lstStyle/>
           <a:p>
             <a:pPr algn="ctr"/>
-            <a:endParaRPr/>
           </a:p>
         </p:txBody>
       </p:sp>
@@ -3551,7 +3479,6 @@
           <a:lstStyle/>
           <a:p>
             <a:pPr algn="ctr"/>
-            <a:endParaRPr/>
           </a:p>
         </p:txBody>
       </p:sp>
@@ -3656,7 +3583,6 @@
           <a:lstStyle/>
           <a:p>
             <a:pPr algn="ctr"/>
-            <a:endParaRPr/>
           </a:p>
         </p:txBody>
       </p:sp>
@@ -3761,7 +3687,6 @@
           <a:lstStyle/>
           <a:p>
             <a:pPr algn="ctr"/>
-            <a:endParaRPr/>
           </a:p>
         </p:txBody>
       </p:sp>
@@ -3866,7 +3791,6 @@
           <a:lstStyle/>
           <a:p>
             <a:pPr algn="ctr"/>
-            <a:endParaRPr/>
           </a:p>
         </p:txBody>
       </p:sp>
@@ -3937,8 +3861,8 @@
         </p:nvSpPr>
         <p:spPr>
           <a:xfrm>
-            <a:off x="180000" y="2340000"/>
-            <a:ext cx="4320000" cy="1440000"/>
+            <a:off x="180000" y="1980000"/>
+            <a:ext cx="3600000" cy="1440000"/>
           </a:xfrm>
           <a:prstGeom prst="rect">
             <a:avLst/>
@@ -3967,7 +3891,6 @@
           <a:lstStyle/>
           <a:p>
             <a:pPr algn="ctr"/>
-            <a:endParaRPr/>
           </a:p>
         </p:txBody>
       </p:sp>
@@ -3979,8 +3902,8 @@
         </p:nvSpPr>
         <p:spPr>
           <a:xfrm>
-            <a:off x="180000" y="2340000"/>
-            <a:ext cx="4320000" cy="432000"/>
+            <a:off x="180000" y="1980000"/>
+            <a:ext cx="3600000" cy="432000"/>
           </a:xfrm>
           <a:prstGeom prst="rect">
             <a:avLst/>
@@ -3994,7 +3917,7 @@
           <a:lstStyle/>
           <a:p>
             <a:r>
-              <a:rPr sz="2160" b="1" dirty="0">
+              <a:rPr b="1" sz="2160">
                 <a:solidFill>
                   <a:srgbClr val="000000"/>
                 </a:solidFill>
@@ -4012,8 +3935,8 @@
         </p:nvSpPr>
         <p:spPr>
           <a:xfrm>
-            <a:off x="180000" y="2700000"/>
-            <a:ext cx="4320000" cy="1440000"/>
+            <a:off x="180000" y="2340000"/>
+            <a:ext cx="3600000" cy="1440000"/>
           </a:xfrm>
           <a:prstGeom prst="rect">
             <a:avLst/>
@@ -4027,27 +3950,19 @@
           <a:lstStyle/>
           <a:p>
             <a:r>
-              <a:rPr sz="1440" dirty="0" err="1">
+              <a:rPr sz="1440">
                 <a:solidFill>
                   <a:srgbClr val="000000"/>
                 </a:solidFill>
               </a:rPr>
-              <a:t>Honestycar</a:t>
-            </a:r>
-            <a:r>
-              <a:rPr sz="1440" dirty="0">
-                <a:solidFill>
-                  <a:srgbClr val="000000"/>
-                </a:solidFill>
-              </a:rPr>
-              <a:t> faces significant cybersecurity risks like improper input validation, weak ciphers, and insecure file upload functionality and network vulnerabilities. These weaknesses pose significant risks to data integrity, confidentiality, and business operations.​</a:t>
-            </a:r>
-          </a:p>
-        </p:txBody>
-      </p:sp>
-      <p:sp>
-        <p:nvSpPr>
-          <p:cNvPr id="21" name="CustomYellowBox"/>
+              <a:t>Honestycar faces significant cybersecurity risks like improper input validation, weak ciphers, and insecure file upload functionality and network vulnerabilities. These weaknesses pose significant risks to data integrity, confidentiality, and business operations.​</a:t>
+            </a:r>
+          </a:p>
+        </p:txBody>
+      </p:sp>
+      <p:sp>
+        <p:nvSpPr>
+          <p:cNvPr id="1" name="CustomYellowBox"/>
           <p:cNvSpPr/>
           <p:nvPr/>
         </p:nvSpPr>
@@ -4100,9 +4015,7 @@
         <p:txBody>
           <a:bodyPr/>
           <a:lstStyle/>
-          <a:p>
-            <a:endParaRPr/>
-          </a:p>
+          <a:p/>
         </p:txBody>
       </p:sp>
       <p:sp>
@@ -4125,14 +4038,14 @@
           </a:ln>
         </p:spPr>
         <p:txBody>
-          <a:bodyPr wrap="square" lIns="108000" tIns="36000" rIns="72000" bIns="36000" anchor="ctr">
+          <a:bodyPr wrap="square" lIns="108000" rIns="72000" tIns="36000" bIns="36000" anchor="ctr">
             <a:noAutofit/>
           </a:bodyPr>
           <a:lstStyle/>
           <a:p>
             <a:pPr algn="l"/>
             <a:r>
-              <a:rPr sz="2200">
+              <a:rPr sz="2000">
                 <a:solidFill>
                   <a:srgbClr val="000000"/>
                 </a:solidFill>
@@ -4144,7 +4057,7 @@
 </a:t>
             </a:r>
             <a:r>
-              <a:rPr sz="3500" b="1">
+              <a:rPr sz="3800" b="1">
                 <a:solidFill>
                   <a:srgbClr val="000000"/>
                 </a:solidFill>
@@ -4174,14 +4087,14 @@
           </a:ln>
         </p:spPr>
         <p:txBody>
-          <a:bodyPr wrap="square" lIns="108000" tIns="36000" rIns="72000" bIns="36000" anchor="ctr">
+          <a:bodyPr wrap="square" lIns="108000" rIns="72000" tIns="36000" bIns="36000" anchor="ctr">
             <a:noAutofit/>
           </a:bodyPr>
           <a:lstStyle/>
           <a:p>
             <a:pPr algn="l"/>
             <a:r>
-              <a:rPr sz="2200">
+              <a:rPr sz="2000">
                 <a:solidFill>
                   <a:srgbClr val="000000"/>
                 </a:solidFill>
@@ -4193,12 +4106,122 @@
 </a:t>
             </a:r>
             <a:r>
-              <a:rPr sz="3500" b="1">
+              <a:rPr sz="3800" b="1">
                 <a:solidFill>
                   <a:srgbClr val="000000"/>
                 </a:solidFill>
               </a:rPr>
               <a:t>45</a:t>
+            </a:r>
+          </a:p>
+        </p:txBody>
+      </p:sp>
+      <p:sp>
+        <p:nvSpPr>
+          <p:cNvPr id="1" name="CustomBlueBox"/>
+          <p:cNvSpPr/>
+          <p:nvPr/>
+        </p:nvSpPr>
+        <p:spPr>
+          <a:xfrm>
+            <a:off x="3960000" y="1440000"/>
+            <a:ext cx="3600000" cy="2034000"/>
+          </a:xfrm>
+          <a:custGeom>
+            <a:avLst/>
+            <a:gdLst/>
+            <a:ahLst/>
+            <a:cxnLst/>
+            <a:rect l="0" t="0" r="3600000" b="2034000"/>
+            <a:pathLst>
+              <a:path w="3600000" h="2034000">
+                <a:moveTo>
+                  <a:pt x="209550" y="0"/>
+                </a:moveTo>
+                <a:lnTo>
+                  <a:pt x="3600000" y="0"/>
+                </a:lnTo>
+                <a:lnTo>
+                  <a:pt x="3600000" y="2034000"/>
+                </a:lnTo>
+                <a:lnTo>
+                  <a:pt x="0" y="2034000"/>
+                </a:lnTo>
+                <a:lnTo>
+                  <a:pt x="0" y="209550"/>
+                </a:lnTo>
+                <a:arcTo wR="209550" hR="209550" stAng="10800000" swAng="5400000"/>
+                <a:close/>
+              </a:path>
+            </a:pathLst>
+          </a:custGeom>
+          <a:solidFill>
+            <a:srgbClr val="00B0F0"/>
+          </a:solidFill>
+          <a:ln w="18288">
+            <a:solidFill>
+              <a:srgbClr val="00B0F0"/>
+            </a:solidFill>
+          </a:ln>
+          <a:effectLst>
+            <a:outerShdw blurRad="76200" dist="38100" dir="2700000" rotWithShape="0">
+              <a:srgbClr val="000000">
+                <a:alpha val="40000"/>
+              </a:srgbClr>
+            </a:outerShdw>
+          </a:effectLst>
+        </p:spPr>
+        <p:txBody>
+          <a:bodyPr/>
+          <a:lstStyle/>
+          <a:p/>
+        </p:txBody>
+      </p:sp>
+      <p:sp>
+        <p:nvSpPr>
+          <p:cNvPr id="24" name="TextBox 23"/>
+          <p:cNvSpPr txBox="1"/>
+          <p:nvPr/>
+        </p:nvSpPr>
+        <p:spPr>
+          <a:xfrm>
+            <a:off x="3960000" y="1440000"/>
+            <a:ext cx="3600000" cy="2034000"/>
+          </a:xfrm>
+          <a:prstGeom prst="rect">
+            <a:avLst/>
+          </a:prstGeom>
+          <a:noFill/>
+          <a:ln>
+            <a:noFill/>
+          </a:ln>
+        </p:spPr>
+        <p:txBody>
+          <a:bodyPr wrap="square" lIns="108000" rIns="72000" tIns="0" bIns="72000">
+            <a:spAutoFit/>
+          </a:bodyPr>
+          <a:lstStyle/>
+          <a:p>
+            <a:pPr algn="l"/>
+            <a:r>
+              <a:rPr b="1" sz="2800">
+                <a:solidFill>
+                  <a:srgbClr val="000000"/>
+                </a:solidFill>
+              </a:rPr>
+              <a:t>Honestycar Security Intelligence Report</a:t>
+            </a:r>
+            <a:r>
+              <a:t>
+</a:t>
+            </a:r>
+            <a:r>
+              <a:rPr sz="1400">
+                <a:solidFill>
+                  <a:srgbClr val="000000"/>
+                </a:solidFill>
+              </a:rPr>
+              <a:t>An external perspective, emulating the tactics and techniques employed by real-world attackers using passive reconnaissance to identify potential vulnerabilities that cybercriminals could exploit </a:t>
             </a:r>
           </a:p>
         </p:txBody>
@@ -4212,7 +4235,7 @@
 </file>
 
 <file path=ppt/slides/slide2.xml><?xml version="1.0" encoding="utf-8"?>
-<p:sld xmlns:a="http://schemas.openxmlformats.org/drawingml/2006/main" xmlns:r="http://schemas.openxmlformats.org/officeDocument/2006/relationships" xmlns:p="http://schemas.openxmlformats.org/presentationml/2006/main">
+<p:sld xmlns:a="http://schemas.openxmlformats.org/drawingml/2006/main" xmlns:p="http://schemas.openxmlformats.org/presentationml/2006/main" xmlns:r="http://schemas.openxmlformats.org/officeDocument/2006/relationships">
   <p:cSld>
     <p:spTree>
       <p:nvGrpSpPr>
@@ -4220,14 +4243,7 @@
         <p:cNvGrpSpPr/>
         <p:nvPr/>
       </p:nvGrpSpPr>
-      <p:grpSpPr>
-        <a:xfrm>
-          <a:off x="0" y="0"/>
-          <a:ext cx="0" cy="0"/>
-          <a:chOff x="0" y="0"/>
-          <a:chExt cx="0" cy="0"/>
-        </a:xfrm>
-      </p:grpSpPr>
+      <p:grpSpPr/>
       <p:pic>
         <p:nvPicPr>
           <p:cNvPr id="2" name="Picture 1" descr="2.jpg"/>
@@ -4302,7 +4318,7 @@
         </p:xfrm>
         <a:graphic>
           <a:graphicData uri="http://schemas.openxmlformats.org/drawingml/2006/chart">
-            <c:chart xmlns:c="http://schemas.openxmlformats.org/drawingml/2006/chart" xmlns:r="http://schemas.openxmlformats.org/officeDocument/2006/relationships" r:id="rId3"/>
+            <c:chart xmlns:c="http://schemas.openxmlformats.org/drawingml/2006/chart" r:id="rId3"/>
           </a:graphicData>
         </a:graphic>
       </p:graphicFrame>
@@ -4325,20 +4341,8 @@
                 <a:tableStyleId>{5C22544A-7EE6-4342-B048-85BDC9FD1C3A}</a:tableStyleId>
               </a:tblPr>
               <a:tblGrid>
-                <a:gridCol w="2160000">
-                  <a:extLst>
-                    <a:ext uri="{9D8B030D-6E8A-4147-A177-3AD203B41FA5}">
-                      <a16:colId xmlns:a16="http://schemas.microsoft.com/office/drawing/2014/main" val="20000"/>
-                    </a:ext>
-                  </a:extLst>
-                </a:gridCol>
-                <a:gridCol w="900000">
-                  <a:extLst>
-                    <a:ext uri="{9D8B030D-6E8A-4147-A177-3AD203B41FA5}">
-                      <a16:colId xmlns:a16="http://schemas.microsoft.com/office/drawing/2014/main" val="20001"/>
-                    </a:ext>
-                  </a:extLst>
-                </a:gridCol>
+                <a:gridCol w="2160000"/>
+                <a:gridCol w="900000"/>
               </a:tblGrid>
               <a:tr h="320000">
                 <a:tc>
@@ -4348,7 +4352,7 @@
                     <a:p>
                       <a:pPr algn="l"/>
                       <a:r>
-                        <a:rPr sz="992" b="1">
+                        <a:rPr b="1" sz="992">
                           <a:solidFill>
                             <a:srgbClr val="FFFFFF"/>
                           </a:solidFill>
@@ -4357,7 +4361,7 @@
                       </a:r>
                     </a:p>
                   </a:txBody>
-                  <a:tcPr marL="36000" marR="36000" marT="18000" marB="18000" anchor="ctr">
+                  <a:tcPr anchor="ctr" marL="36000" marR="36000" marT="18000" marB="18000">
                     <a:solidFill>
                       <a:srgbClr val="0780B5"/>
                     </a:solidFill>
@@ -4370,7 +4374,7 @@
                     <a:p>
                       <a:pPr algn="l"/>
                       <a:r>
-                        <a:rPr sz="992" b="1">
+                        <a:rPr b="1" sz="992">
                           <a:solidFill>
                             <a:srgbClr val="FFFFFF"/>
                           </a:solidFill>
@@ -4379,17 +4383,12 @@
                       </a:r>
                     </a:p>
                   </a:txBody>
-                  <a:tcPr marL="36000" marR="36000" marT="18000" marB="18000" anchor="ctr">
+                  <a:tcPr anchor="ctr" marL="36000" marR="36000" marT="18000" marB="18000">
                     <a:solidFill>
                       <a:srgbClr val="0780B5"/>
                     </a:solidFill>
                   </a:tcPr>
                 </a:tc>
-                <a:extLst>
-                  <a:ext uri="{0D108BD9-81ED-4DB2-BD59-A6C34878D82A}">
-                    <a16:rowId xmlns:a16="http://schemas.microsoft.com/office/drawing/2014/main" val="10000"/>
-                  </a:ext>
-                </a:extLst>
               </a:tr>
               <a:tr h="320000">
                 <a:tc>
@@ -4408,7 +4407,7 @@
                       </a:r>
                     </a:p>
                   </a:txBody>
-                  <a:tcPr marL="36000" marR="36000" marT="18000" marB="18000" anchor="ctr"/>
+                  <a:tcPr anchor="ctr" marL="36000" marR="36000" marT="18000" marB="18000"/>
                 </a:tc>
                 <a:tc>
                   <a:txBody>
@@ -4426,13 +4425,8 @@
                       </a:r>
                     </a:p>
                   </a:txBody>
-                  <a:tcPr marL="36000" marR="36000" marT="18000" marB="18000" anchor="ctr"/>
+                  <a:tcPr anchor="ctr" marL="36000" marR="36000" marT="18000" marB="18000"/>
                 </a:tc>
-                <a:extLst>
-                  <a:ext uri="{0D108BD9-81ED-4DB2-BD59-A6C34878D82A}">
-                    <a16:rowId xmlns:a16="http://schemas.microsoft.com/office/drawing/2014/main" val="10001"/>
-                  </a:ext>
-                </a:extLst>
               </a:tr>
               <a:tr h="320000">
                 <a:tc>
@@ -4451,7 +4445,7 @@
                       </a:r>
                     </a:p>
                   </a:txBody>
-                  <a:tcPr marL="36000" marR="36000" marT="18000" marB="18000" anchor="ctr">
+                  <a:tcPr anchor="ctr" marL="36000" marR="36000" marT="18000" marB="18000">
                     <a:solidFill>
                       <a:srgbClr val="E6F0FA"/>
                     </a:solidFill>
@@ -4473,17 +4467,12 @@
                       </a:r>
                     </a:p>
                   </a:txBody>
-                  <a:tcPr marL="36000" marR="36000" marT="18000" marB="18000" anchor="ctr">
+                  <a:tcPr anchor="ctr" marL="36000" marR="36000" marT="18000" marB="18000">
                     <a:solidFill>
                       <a:srgbClr val="E6F0FA"/>
                     </a:solidFill>
                   </a:tcPr>
                 </a:tc>
-                <a:extLst>
-                  <a:ext uri="{0D108BD9-81ED-4DB2-BD59-A6C34878D82A}">
-                    <a16:rowId xmlns:a16="http://schemas.microsoft.com/office/drawing/2014/main" val="10002"/>
-                  </a:ext>
-                </a:extLst>
               </a:tr>
               <a:tr h="320000">
                 <a:tc>
@@ -4502,7 +4491,7 @@
                       </a:r>
                     </a:p>
                   </a:txBody>
-                  <a:tcPr marL="36000" marR="36000" marT="18000" marB="18000" anchor="ctr"/>
+                  <a:tcPr anchor="ctr" marL="36000" marR="36000" marT="18000" marB="18000"/>
                 </a:tc>
                 <a:tc>
                   <a:txBody>
@@ -4520,13 +4509,8 @@
                       </a:r>
                     </a:p>
                   </a:txBody>
-                  <a:tcPr marL="36000" marR="36000" marT="18000" marB="18000" anchor="ctr"/>
+                  <a:tcPr anchor="ctr" marL="36000" marR="36000" marT="18000" marB="18000"/>
                 </a:tc>
-                <a:extLst>
-                  <a:ext uri="{0D108BD9-81ED-4DB2-BD59-A6C34878D82A}">
-                    <a16:rowId xmlns:a16="http://schemas.microsoft.com/office/drawing/2014/main" val="10003"/>
-                  </a:ext>
-                </a:extLst>
               </a:tr>
               <a:tr h="320000">
                 <a:tc>
@@ -4545,7 +4529,7 @@
                       </a:r>
                     </a:p>
                   </a:txBody>
-                  <a:tcPr marL="36000" marR="36000" marT="18000" marB="18000" anchor="ctr">
+                  <a:tcPr anchor="ctr" marL="36000" marR="36000" marT="18000" marB="18000">
                     <a:solidFill>
                       <a:srgbClr val="E6F0FA"/>
                     </a:solidFill>
@@ -4567,17 +4551,12 @@
                       </a:r>
                     </a:p>
                   </a:txBody>
-                  <a:tcPr marL="36000" marR="36000" marT="18000" marB="18000" anchor="ctr">
+                  <a:tcPr anchor="ctr" marL="36000" marR="36000" marT="18000" marB="18000">
                     <a:solidFill>
                       <a:srgbClr val="E6F0FA"/>
                     </a:solidFill>
                   </a:tcPr>
                 </a:tc>
-                <a:extLst>
-                  <a:ext uri="{0D108BD9-81ED-4DB2-BD59-A6C34878D82A}">
-                    <a16:rowId xmlns:a16="http://schemas.microsoft.com/office/drawing/2014/main" val="10004"/>
-                  </a:ext>
-                </a:extLst>
               </a:tr>
               <a:tr h="320000">
                 <a:tc>
@@ -4596,7 +4575,7 @@
                       </a:r>
                     </a:p>
                   </a:txBody>
-                  <a:tcPr marL="36000" marR="36000" marT="18000" marB="18000" anchor="ctr"/>
+                  <a:tcPr anchor="ctr" marL="36000" marR="36000" marT="18000" marB="18000"/>
                 </a:tc>
                 <a:tc>
                   <a:txBody>
@@ -4614,13 +4593,8 @@
                       </a:r>
                     </a:p>
                   </a:txBody>
-                  <a:tcPr marL="36000" marR="36000" marT="18000" marB="18000" anchor="ctr"/>
+                  <a:tcPr anchor="ctr" marL="36000" marR="36000" marT="18000" marB="18000"/>
                 </a:tc>
-                <a:extLst>
-                  <a:ext uri="{0D108BD9-81ED-4DB2-BD59-A6C34878D82A}">
-                    <a16:rowId xmlns:a16="http://schemas.microsoft.com/office/drawing/2014/main" val="10005"/>
-                  </a:ext>
-                </a:extLst>
               </a:tr>
               <a:tr h="320000">
                 <a:tc>
@@ -4639,7 +4613,7 @@
                       </a:r>
                     </a:p>
                   </a:txBody>
-                  <a:tcPr marL="36000" marR="36000" marT="18000" marB="18000" anchor="ctr">
+                  <a:tcPr anchor="ctr" marL="36000" marR="36000" marT="18000" marB="18000">
                     <a:solidFill>
                       <a:srgbClr val="E6F0FA"/>
                     </a:solidFill>
@@ -4661,17 +4635,12 @@
                       </a:r>
                     </a:p>
                   </a:txBody>
-                  <a:tcPr marL="36000" marR="36000" marT="18000" marB="18000" anchor="ctr">
+                  <a:tcPr anchor="ctr" marL="36000" marR="36000" marT="18000" marB="18000">
                     <a:solidFill>
                       <a:srgbClr val="E6F0FA"/>
                     </a:solidFill>
                   </a:tcPr>
                 </a:tc>
-                <a:extLst>
-                  <a:ext uri="{0D108BD9-81ED-4DB2-BD59-A6C34878D82A}">
-                    <a16:rowId xmlns:a16="http://schemas.microsoft.com/office/drawing/2014/main" val="10006"/>
-                  </a:ext>
-                </a:extLst>
               </a:tr>
               <a:tr h="320000">
                 <a:tc>
@@ -4690,7 +4659,7 @@
                       </a:r>
                     </a:p>
                   </a:txBody>
-                  <a:tcPr marL="36000" marR="36000" marT="18000" marB="18000" anchor="ctr"/>
+                  <a:tcPr anchor="ctr" marL="36000" marR="36000" marT="18000" marB="18000"/>
                 </a:tc>
                 <a:tc>
                   <a:txBody>
@@ -4708,13 +4677,8 @@
                       </a:r>
                     </a:p>
                   </a:txBody>
-                  <a:tcPr marL="36000" marR="36000" marT="18000" marB="18000" anchor="ctr"/>
+                  <a:tcPr anchor="ctr" marL="36000" marR="36000" marT="18000" marB="18000"/>
                 </a:tc>
-                <a:extLst>
-                  <a:ext uri="{0D108BD9-81ED-4DB2-BD59-A6C34878D82A}">
-                    <a16:rowId xmlns:a16="http://schemas.microsoft.com/office/drawing/2014/main" val="10007"/>
-                  </a:ext>
-                </a:extLst>
               </a:tr>
               <a:tr h="320000">
                 <a:tc>
@@ -4733,7 +4697,7 @@
                       </a:r>
                     </a:p>
                   </a:txBody>
-                  <a:tcPr marL="36000" marR="36000" marT="18000" marB="18000" anchor="ctr">
+                  <a:tcPr anchor="ctr" marL="36000" marR="36000" marT="18000" marB="18000">
                     <a:solidFill>
                       <a:srgbClr val="E6F0FA"/>
                     </a:solidFill>
@@ -4755,17 +4719,12 @@
                       </a:r>
                     </a:p>
                   </a:txBody>
-                  <a:tcPr marL="36000" marR="36000" marT="18000" marB="18000" anchor="ctr">
+                  <a:tcPr anchor="ctr" marL="36000" marR="36000" marT="18000" marB="18000">
                     <a:solidFill>
                       <a:srgbClr val="E6F0FA"/>
                     </a:solidFill>
                   </a:tcPr>
                 </a:tc>
-                <a:extLst>
-                  <a:ext uri="{0D108BD9-81ED-4DB2-BD59-A6C34878D82A}">
-                    <a16:rowId xmlns:a16="http://schemas.microsoft.com/office/drawing/2014/main" val="10008"/>
-                  </a:ext>
-                </a:extLst>
               </a:tr>
             </a:tbl>
           </a:graphicData>
@@ -4790,20 +4749,8 @@
                 <a:tableStyleId>{5C22544A-7EE6-4342-B048-85BDC9FD1C3A}</a:tableStyleId>
               </a:tblPr>
               <a:tblGrid>
-                <a:gridCol w="1440000">
-                  <a:extLst>
-                    <a:ext uri="{9D8B030D-6E8A-4147-A177-3AD203B41FA5}">
-                      <a16:colId xmlns:a16="http://schemas.microsoft.com/office/drawing/2014/main" val="20000"/>
-                    </a:ext>
-                  </a:extLst>
-                </a:gridCol>
-                <a:gridCol w="5400000">
-                  <a:extLst>
-                    <a:ext uri="{9D8B030D-6E8A-4147-A177-3AD203B41FA5}">
-                      <a16:colId xmlns:a16="http://schemas.microsoft.com/office/drawing/2014/main" val="20001"/>
-                    </a:ext>
-                  </a:extLst>
-                </a:gridCol>
+                <a:gridCol w="1440000"/>
+                <a:gridCol w="5400000"/>
               </a:tblGrid>
               <a:tr h="405000">
                 <a:tc>
@@ -4813,7 +4760,7 @@
                     <a:p>
                       <a:pPr algn="l"/>
                       <a:r>
-                        <a:rPr sz="992" b="1">
+                        <a:rPr b="1" sz="992">
                           <a:solidFill>
                             <a:srgbClr val="FFFFFF"/>
                           </a:solidFill>
@@ -4822,7 +4769,7 @@
                       </a:r>
                     </a:p>
                   </a:txBody>
-                  <a:tcPr marL="36000" marR="36000" marT="18000" marB="18000" anchor="ctr">
+                  <a:tcPr anchor="ctr" marL="36000" marR="36000" marT="18000" marB="18000">
                     <a:solidFill>
                       <a:srgbClr val="0780B5"/>
                     </a:solidFill>
@@ -4835,7 +4782,7 @@
                     <a:p>
                       <a:pPr algn="l"/>
                       <a:r>
-                        <a:rPr sz="992" b="1">
+                        <a:rPr b="1" sz="992">
                           <a:solidFill>
                             <a:srgbClr val="FFFFFF"/>
                           </a:solidFill>
@@ -4844,17 +4791,12 @@
                       </a:r>
                     </a:p>
                   </a:txBody>
-                  <a:tcPr marL="36000" marR="36000" marT="18000" marB="18000" anchor="ctr">
+                  <a:tcPr anchor="ctr" marL="36000" marR="36000" marT="18000" marB="18000">
                     <a:solidFill>
                       <a:srgbClr val="0780B5"/>
                     </a:solidFill>
                   </a:tcPr>
                 </a:tc>
-                <a:extLst>
-                  <a:ext uri="{0D108BD9-81ED-4DB2-BD59-A6C34878D82A}">
-                    <a16:rowId xmlns:a16="http://schemas.microsoft.com/office/drawing/2014/main" val="10000"/>
-                  </a:ext>
-                </a:extLst>
               </a:tr>
               <a:tr h="405000">
                 <a:tc>
@@ -4873,7 +4815,7 @@
                       </a:r>
                     </a:p>
                   </a:txBody>
-                  <a:tcPr marL="36000" marR="36000" marT="18000" marB="18000" anchor="ctr"/>
+                  <a:tcPr anchor="ctr" marL="36000" marR="36000" marT="18000" marB="18000"/>
                 </a:tc>
                 <a:tc>
                   <a:txBody>
@@ -4891,13 +4833,8 @@
                       </a:r>
                     </a:p>
                   </a:txBody>
-                  <a:tcPr marL="36000" marR="36000" marT="18000" marB="18000" anchor="ctr"/>
+                  <a:tcPr anchor="ctr" marL="36000" marR="36000" marT="18000" marB="18000"/>
                 </a:tc>
-                <a:extLst>
-                  <a:ext uri="{0D108BD9-81ED-4DB2-BD59-A6C34878D82A}">
-                    <a16:rowId xmlns:a16="http://schemas.microsoft.com/office/drawing/2014/main" val="10001"/>
-                  </a:ext>
-                </a:extLst>
               </a:tr>
               <a:tr h="405000">
                 <a:tc>
@@ -4916,7 +4853,7 @@
                       </a:r>
                     </a:p>
                   </a:txBody>
-                  <a:tcPr marL="36000" marR="36000" marT="18000" marB="18000" anchor="ctr">
+                  <a:tcPr anchor="ctr" marL="36000" marR="36000" marT="18000" marB="18000">
                     <a:solidFill>
                       <a:srgbClr val="E6F0FA"/>
                     </a:solidFill>
@@ -4938,17 +4875,12 @@
                       </a:r>
                     </a:p>
                   </a:txBody>
-                  <a:tcPr marL="36000" marR="36000" marT="18000" marB="18000" anchor="ctr">
+                  <a:tcPr anchor="ctr" marL="36000" marR="36000" marT="18000" marB="18000">
                     <a:solidFill>
                       <a:srgbClr val="E6F0FA"/>
                     </a:solidFill>
                   </a:tcPr>
                 </a:tc>
-                <a:extLst>
-                  <a:ext uri="{0D108BD9-81ED-4DB2-BD59-A6C34878D82A}">
-                    <a16:rowId xmlns:a16="http://schemas.microsoft.com/office/drawing/2014/main" val="10002"/>
-                  </a:ext>
-                </a:extLst>
               </a:tr>
               <a:tr h="405000">
                 <a:tc>
@@ -4967,7 +4899,7 @@
                       </a:r>
                     </a:p>
                   </a:txBody>
-                  <a:tcPr marL="36000" marR="36000" marT="18000" marB="18000" anchor="ctr"/>
+                  <a:tcPr anchor="ctr" marL="36000" marR="36000" marT="18000" marB="18000"/>
                 </a:tc>
                 <a:tc>
                   <a:txBody>
@@ -4985,13 +4917,8 @@
                       </a:r>
                     </a:p>
                   </a:txBody>
-                  <a:tcPr marL="36000" marR="36000" marT="18000" marB="18000" anchor="ctr"/>
+                  <a:tcPr anchor="ctr" marL="36000" marR="36000" marT="18000" marB="18000"/>
                 </a:tc>
-                <a:extLst>
-                  <a:ext uri="{0D108BD9-81ED-4DB2-BD59-A6C34878D82A}">
-                    <a16:rowId xmlns:a16="http://schemas.microsoft.com/office/drawing/2014/main" val="10003"/>
-                  </a:ext>
-                </a:extLst>
               </a:tr>
             </a:tbl>
           </a:graphicData>
@@ -5160,13 +5087,7 @@
               <a:t>Why Learn More?</a:t>
             </a:r>
           </a:p>
-          <a:p>
-            <a:endParaRPr sz="1417">
-              <a:solidFill>
-                <a:srgbClr val="000000"/>
-              </a:solidFill>
-            </a:endParaRPr>
-          </a:p>
+          <a:p/>
         </p:txBody>
       </p:sp>
       <p:sp>
@@ -5209,7 +5130,6 @@
           <a:lstStyle/>
           <a:p>
             <a:pPr algn="ctr"/>
-            <a:endParaRPr/>
           </a:p>
         </p:txBody>
       </p:sp>
@@ -5254,7 +5174,7 @@
           <a:noFill/>
         </p:spPr>
         <p:txBody>
-          <a:bodyPr wrap="none" lIns="0" tIns="36000" rIns="0" bIns="0">
+          <a:bodyPr wrap="none" lIns="0" rIns="0" tIns="36000" bIns="0">
             <a:spAutoFit/>
           </a:bodyPr>
           <a:lstStyle/>
@@ -5322,7 +5242,6 @@
           <a:lstStyle/>
           <a:p>
             <a:pPr algn="ctr"/>
-            <a:endParaRPr/>
           </a:p>
         </p:txBody>
       </p:sp>
@@ -5367,7 +5286,7 @@
           <a:noFill/>
         </p:spPr>
         <p:txBody>
-          <a:bodyPr wrap="none" lIns="0" tIns="36000" rIns="0" bIns="0">
+          <a:bodyPr wrap="none" lIns="0" rIns="0" tIns="36000" bIns="0">
             <a:spAutoFit/>
           </a:bodyPr>
           <a:lstStyle/>
@@ -5435,7 +5354,6 @@
           <a:lstStyle/>
           <a:p>
             <a:pPr algn="ctr"/>
-            <a:endParaRPr/>
           </a:p>
         </p:txBody>
       </p:sp>
@@ -5480,7 +5398,7 @@
           <a:noFill/>
         </p:spPr>
         <p:txBody>
-          <a:bodyPr wrap="none" lIns="0" tIns="36000" rIns="0" bIns="0">
+          <a:bodyPr wrap="none" lIns="0" rIns="0" tIns="36000" bIns="0">
             <a:spAutoFit/>
           </a:bodyPr>
           <a:lstStyle/>
@@ -5565,9 +5483,7 @@
             <a:spAutoFit/>
           </a:bodyPr>
           <a:lstStyle/>
-          <a:p>
-            <a:endParaRPr/>
-          </a:p>
+          <a:p/>
         </p:txBody>
       </p:sp>
       <p:sp>
@@ -5587,7 +5503,7 @@
           <a:noFill/>
         </p:spPr>
         <p:txBody>
-          <a:bodyPr wrap="square" lIns="0" tIns="0" rIns="0" bIns="0">
+          <a:bodyPr wrap="square" lIns="0" rIns="0" tIns="0" bIns="0">
             <a:spAutoFit/>
           </a:bodyPr>
           <a:lstStyle/>
@@ -5629,7 +5545,7 @@
           <a:noFill/>
         </p:spPr>
         <p:txBody>
-          <a:bodyPr wrap="none" lIns="0" tIns="0" rIns="0" bIns="0">
+          <a:bodyPr wrap="none" lIns="0" rIns="0" tIns="0" bIns="0">
             <a:spAutoFit/>
           </a:bodyPr>
           <a:lstStyle/>

</xml_diff>